<commit_message>
Version 1.1.4 - Staging
</commit_message>
<xml_diff>
--- a/docs/Waukesha Week 21.pptx
+++ b/docs/Waukesha Week 21.pptx
@@ -205,7 +205,7 @@
           <a:p>
             <a:fld id="{C728C53A-7C57-8F45-972A-66434054A8D6}" type="datetimeFigureOut">
               <a:rPr lang="en-US" smtClean="0"/>
-              <a:t>6/4/25</a:t>
+              <a:t>6/5/25</a:t>
             </a:fld>
             <a:endParaRPr lang="en-US"/>
           </a:p>
@@ -1176,7 +1176,7 @@
           <a:p>
             <a:fld id="{48A87A34-81AB-432B-8DAE-1953F412C126}" type="datetimeFigureOut">
               <a:rPr lang="en-US" dirty="0"/>
-              <a:t>6/4/25</a:t>
+              <a:t>6/5/25</a:t>
             </a:fld>
             <a:endParaRPr lang="en-US" dirty="0"/>
           </a:p>
@@ -1438,7 +1438,7 @@
           <a:p>
             <a:fld id="{48A87A34-81AB-432B-8DAE-1953F412C126}" type="datetimeFigureOut">
               <a:rPr lang="en-US" dirty="0"/>
-              <a:t>6/4/25</a:t>
+              <a:t>6/5/25</a:t>
             </a:fld>
             <a:endParaRPr lang="en-US" dirty="0"/>
           </a:p>
@@ -1665,7 +1665,7 @@
             <a:fld id="{48A87A34-81AB-432B-8DAE-1953F412C126}" type="datetimeFigureOut">
               <a:rPr lang="en-US" dirty="0"/>
               <a:pPr/>
-              <a:t>6/4/25</a:t>
+              <a:t>6/5/25</a:t>
             </a:fld>
             <a:endParaRPr lang="en-US" dirty="0"/>
           </a:p>
@@ -1971,7 +1971,7 @@
             <a:fld id="{48A87A34-81AB-432B-8DAE-1953F412C126}" type="datetimeFigureOut">
               <a:rPr lang="en-US" dirty="0"/>
               <a:pPr/>
-              <a:t>6/4/25</a:t>
+              <a:t>6/5/25</a:t>
             </a:fld>
             <a:endParaRPr lang="en-US" dirty="0"/>
           </a:p>
@@ -2440,7 +2440,7 @@
             <a:fld id="{48A87A34-81AB-432B-8DAE-1953F412C126}" type="datetimeFigureOut">
               <a:rPr lang="en-US" dirty="0"/>
               <a:pPr/>
-              <a:t>6/4/25</a:t>
+              <a:t>6/5/25</a:t>
             </a:fld>
             <a:endParaRPr lang="en-US" dirty="0"/>
           </a:p>
@@ -2982,7 +2982,7 @@
           <a:p>
             <a:fld id="{48A87A34-81AB-432B-8DAE-1953F412C126}" type="datetimeFigureOut">
               <a:rPr lang="en-US" dirty="0"/>
-              <a:t>6/4/25</a:t>
+              <a:t>6/5/25</a:t>
             </a:fld>
             <a:endParaRPr lang="en-US" dirty="0"/>
           </a:p>
@@ -3751,7 +3751,7 @@
           <a:p>
             <a:fld id="{48A87A34-81AB-432B-8DAE-1953F412C126}" type="datetimeFigureOut">
               <a:rPr lang="en-US" dirty="0"/>
-              <a:t>6/4/25</a:t>
+              <a:t>6/5/25</a:t>
             </a:fld>
             <a:endParaRPr lang="en-US" dirty="0"/>
           </a:p>
@@ -3921,7 +3921,7 @@
           <a:p>
             <a:fld id="{48A87A34-81AB-432B-8DAE-1953F412C126}" type="datetimeFigureOut">
               <a:rPr lang="en-US" dirty="0"/>
-              <a:t>6/4/25</a:t>
+              <a:t>6/5/25</a:t>
             </a:fld>
             <a:endParaRPr lang="en-US" dirty="0"/>
           </a:p>
@@ -4140,7 +4140,7 @@
             <a:fld id="{48A87A34-81AB-432B-8DAE-1953F412C126}" type="datetimeFigureOut">
               <a:rPr lang="en-US" dirty="0"/>
               <a:pPr/>
-              <a:t>6/4/25</a:t>
+              <a:t>6/5/25</a:t>
             </a:fld>
             <a:endParaRPr lang="en-US" dirty="0"/>
           </a:p>
@@ -4315,7 +4315,7 @@
           <a:p>
             <a:fld id="{48A87A34-81AB-432B-8DAE-1953F412C126}" type="datetimeFigureOut">
               <a:rPr lang="en-US" dirty="0"/>
-              <a:t>6/4/25</a:t>
+              <a:t>6/5/25</a:t>
             </a:fld>
             <a:endParaRPr lang="en-US" dirty="0"/>
           </a:p>
@@ -4600,7 +4600,7 @@
             <a:fld id="{48A87A34-81AB-432B-8DAE-1953F412C126}" type="datetimeFigureOut">
               <a:rPr lang="en-US" dirty="0"/>
               <a:pPr/>
-              <a:t>6/4/25</a:t>
+              <a:t>6/5/25</a:t>
             </a:fld>
             <a:endParaRPr lang="en-US" dirty="0"/>
           </a:p>
@@ -4837,7 +4837,7 @@
           <a:p>
             <a:fld id="{48A87A34-81AB-432B-8DAE-1953F412C126}" type="datetimeFigureOut">
               <a:rPr lang="en-US" dirty="0"/>
-              <a:t>6/4/25</a:t>
+              <a:t>6/5/25</a:t>
             </a:fld>
             <a:endParaRPr lang="en-US" dirty="0"/>
           </a:p>
@@ -5211,7 +5211,7 @@
           <a:p>
             <a:fld id="{48A87A34-81AB-432B-8DAE-1953F412C126}" type="datetimeFigureOut">
               <a:rPr lang="en-US" dirty="0"/>
-              <a:t>6/4/25</a:t>
+              <a:t>6/5/25</a:t>
             </a:fld>
             <a:endParaRPr lang="en-US" dirty="0"/>
           </a:p>
@@ -5324,7 +5324,7 @@
           <a:p>
             <a:fld id="{48A87A34-81AB-432B-8DAE-1953F412C126}" type="datetimeFigureOut">
               <a:rPr lang="en-US" dirty="0"/>
-              <a:t>6/4/25</a:t>
+              <a:t>6/5/25</a:t>
             </a:fld>
             <a:endParaRPr lang="en-US" dirty="0"/>
           </a:p>
@@ -5414,7 +5414,7 @@
           <a:p>
             <a:fld id="{48A87A34-81AB-432B-8DAE-1953F412C126}" type="datetimeFigureOut">
               <a:rPr lang="en-US" dirty="0"/>
-              <a:t>6/4/25</a:t>
+              <a:t>6/5/25</a:t>
             </a:fld>
             <a:endParaRPr lang="en-US" dirty="0"/>
           </a:p>
@@ -5658,7 +5658,7 @@
           <a:p>
             <a:fld id="{48A87A34-81AB-432B-8DAE-1953F412C126}" type="datetimeFigureOut">
               <a:rPr lang="en-US" dirty="0"/>
-              <a:t>6/4/25</a:t>
+              <a:t>6/5/25</a:t>
             </a:fld>
             <a:endParaRPr lang="en-US" dirty="0"/>
           </a:p>
@@ -5910,7 +5910,7 @@
           <a:p>
             <a:fld id="{48A87A34-81AB-432B-8DAE-1953F412C126}" type="datetimeFigureOut">
               <a:rPr lang="en-US" dirty="0"/>
-              <a:t>6/4/25</a:t>
+              <a:t>6/5/25</a:t>
             </a:fld>
             <a:endParaRPr lang="en-US" dirty="0"/>
           </a:p>
@@ -6149,7 +6149,7 @@
             <a:fld id="{48A87A34-81AB-432B-8DAE-1953F412C126}" type="datetimeFigureOut">
               <a:rPr lang="en-US" dirty="0"/>
               <a:pPr/>
-              <a:t>6/4/25</a:t>
+              <a:t>6/5/25</a:t>
             </a:fld>
             <a:endParaRPr lang="en-US" dirty="0"/>
           </a:p>
@@ -6802,23 +6802,7 @@
                   <a:srgbClr val="FFFF00"/>
                 </a:solidFill>
               </a:rPr>
-              <a:t>Create Course Scrolling Issue </a:t>
-            </a:r>
-            <a:r>
-              <a:rPr lang="en-US">
-                <a:solidFill>
-                  <a:srgbClr val="FFFF00"/>
-                </a:solidFill>
-              </a:rPr>
-              <a:t>– Possibly </a:t>
-            </a:r>
-            <a:r>
-              <a:rPr lang="en-US" dirty="0">
-                <a:solidFill>
-                  <a:srgbClr val="FFFF00"/>
-                </a:solidFill>
-              </a:rPr>
-              <a:t>Fixed in Version 1.1.3</a:t>
+              <a:t>Create Course Scrolling Issue – Possibly Fixed in Version 1.1.3</a:t>
             </a:r>
           </a:p>
           <a:p>
@@ -7925,7 +7909,7 @@
                   <a:srgbClr val="FFFF00"/>
                 </a:solidFill>
               </a:rPr>
-              <a:t>Update to Version 1.0.9</a:t>
+              <a:t>Update to Version 1.1.2</a:t>
             </a:r>
           </a:p>
           <a:p>

</xml_diff>